<commit_message>
Layercontrol ausgebessert, Bericht + Präsentation finalisiert
</commit_message>
<xml_diff>
--- a/präsentation.pptx
+++ b/präsentation.pptx
@@ -109,6 +109,11 @@
       </a:defRPr>
     </a:lvl9pPr>
   </p:defaultTextStyle>
+  <p:extLst>
+    <p:ext uri="{EFAFB233-063F-42B5-8137-9DF3F51BA10A}">
+      <p15:sldGuideLst xmlns:p15="http://schemas.microsoft.com/office/powerpoint/2012/main"/>
+    </p:ext>
+  </p:extLst>
 </p:presentation>
 </file>
 
@@ -207,7 +212,7 @@
           <a:effectLst/>
           <a:extLst>
             <a:ext uri="{91240B29-F687-4f45-9708-019B960494DF}">
-              <a14:hiddenLine xmlns:a14="http://schemas.microsoft.com/office/drawing/2010/main" xmlns="" w="9525">
+              <a14:hiddenLine xmlns="" xmlns:a14="http://schemas.microsoft.com/office/drawing/2010/main" w="9525">
                 <a:solidFill>
                   <a:srgbClr val="000000"/>
                 </a:solidFill>
@@ -400,7 +405,7 @@
             <a:fld id="{08B9EBBA-996F-894A-B54A-D6246ED52CEA}" type="datetimeFigureOut">
               <a:rPr lang="en-US" dirty="0"/>
               <a:pPr/>
-              <a:t>6/12/18</a:t>
+              <a:t>6/13/18</a:t>
             </a:fld>
             <a:endParaRPr lang="en-US" dirty="0"/>
           </a:p>
@@ -720,7 +725,7 @@
             <a:fld id="{18C79C5D-2A6F-F04D-97DA-BEF2467B64E4}" type="datetimeFigureOut">
               <a:rPr lang="en-US" dirty="0"/>
               <a:pPr/>
-              <a:t>6/12/18</a:t>
+              <a:t>6/13/18</a:t>
             </a:fld>
             <a:endParaRPr lang="en-US" dirty="0"/>
           </a:p>
@@ -1215,7 +1220,7 @@
             <a:fld id="{8DFA1846-DA80-1C48-A609-854EA85C59AD}" type="datetimeFigureOut">
               <a:rPr lang="en-US" dirty="0"/>
               <a:pPr/>
-              <a:t>6/12/18</a:t>
+              <a:t>6/13/18</a:t>
             </a:fld>
             <a:endParaRPr lang="en-US" dirty="0"/>
           </a:p>
@@ -1586,7 +1591,7 @@
             <a:fld id="{FBF54567-0DE4-3F47-BF90-CB84690072F9}" type="datetimeFigureOut">
               <a:rPr lang="en-US" dirty="0"/>
               <a:pPr/>
-              <a:t>6/12/18</a:t>
+              <a:t>6/13/18</a:t>
             </a:fld>
             <a:endParaRPr lang="en-US" dirty="0"/>
           </a:p>
@@ -1737,7 +1742,7 @@
           <a:ln/>
           <a:extLst>
             <a:ext uri="{91240B29-F687-4f45-9708-019B960494DF}">
-              <a14:hiddenLine xmlns:a14="http://schemas.microsoft.com/office/drawing/2010/main" xmlns="" w="9525">
+              <a14:hiddenLine xmlns="" xmlns:a14="http://schemas.microsoft.com/office/drawing/2010/main" w="9525">
                 <a:solidFill>
                   <a:srgbClr val="000000"/>
                 </a:solidFill>
@@ -1832,7 +1837,7 @@
             <a:fld id="{C6C52C72-DE31-F449-A4ED-4C594FD91407}" type="datetimeFigureOut">
               <a:rPr lang="en-US" dirty="0"/>
               <a:pPr/>
-              <a:t>6/12/18</a:t>
+              <a:t>6/13/18</a:t>
             </a:fld>
             <a:endParaRPr lang="en-US" dirty="0"/>
           </a:p>
@@ -1985,7 +1990,7 @@
           <a:ln/>
           <a:extLst>
             <a:ext uri="{91240B29-F687-4f45-9708-019B960494DF}">
-              <a14:hiddenLine xmlns:a14="http://schemas.microsoft.com/office/drawing/2010/main" xmlns="" w="9525">
+              <a14:hiddenLine xmlns="" xmlns:a14="http://schemas.microsoft.com/office/drawing/2010/main" w="9525">
                 <a:solidFill>
                   <a:srgbClr val="000000"/>
                 </a:solidFill>
@@ -2090,7 +2095,7 @@
             <a:fld id="{ED62726E-379B-B349-9EED-81ED093FA806}" type="datetimeFigureOut">
               <a:rPr lang="en-US" dirty="0"/>
               <a:pPr/>
-              <a:t>6/12/18</a:t>
+              <a:t>6/13/18</a:t>
             </a:fld>
             <a:endParaRPr lang="en-US" dirty="0"/>
           </a:p>
@@ -2241,7 +2246,7 @@
           <a:ln/>
           <a:extLst>
             <a:ext uri="{91240B29-F687-4f45-9708-019B960494DF}">
-              <a14:hiddenLine xmlns:a14="http://schemas.microsoft.com/office/drawing/2010/main" xmlns="" w="9525">
+              <a14:hiddenLine xmlns="" xmlns:a14="http://schemas.microsoft.com/office/drawing/2010/main" w="9525">
                 <a:solidFill>
                   <a:srgbClr val="000000"/>
                 </a:solidFill>
@@ -2346,7 +2351,7 @@
             <a:fld id="{9B3A1323-8D79-1946-B0D7-40001CF92E9D}" type="datetimeFigureOut">
               <a:rPr lang="en-US" dirty="0"/>
               <a:pPr/>
-              <a:t>6/12/18</a:t>
+              <a:t>6/13/18</a:t>
             </a:fld>
             <a:endParaRPr lang="en-US" dirty="0"/>
           </a:p>
@@ -2691,7 +2696,7 @@
             <a:fld id="{8DFA1846-DA80-1C48-A609-854EA85C59AD}" type="datetimeFigureOut">
               <a:rPr lang="en-US" dirty="0"/>
               <a:pPr/>
-              <a:t>6/12/18</a:t>
+              <a:t>6/13/18</a:t>
             </a:fld>
             <a:endParaRPr lang="en-US" dirty="0"/>
           </a:p>
@@ -2842,7 +2847,7 @@
           <a:ln/>
           <a:extLst>
             <a:ext uri="{91240B29-F687-4f45-9708-019B960494DF}">
-              <a14:hiddenLine xmlns:a14="http://schemas.microsoft.com/office/drawing/2010/main" xmlns="" w="9525">
+              <a14:hiddenLine xmlns="" xmlns:a14="http://schemas.microsoft.com/office/drawing/2010/main" w="9525">
                 <a:solidFill>
                   <a:srgbClr val="000000"/>
                 </a:solidFill>
@@ -2979,7 +2984,7 @@
             <a:fld id="{57302355-E14B-8545-A8F8-0FE83CC9D524}" type="datetimeFigureOut">
               <a:rPr lang="en-US" dirty="0"/>
               <a:pPr/>
-              <a:t>6/12/18</a:t>
+              <a:t>6/13/18</a:t>
             </a:fld>
             <a:endParaRPr lang="en-US" dirty="0"/>
           </a:p>
@@ -3130,7 +3135,7 @@
           <a:ln/>
           <a:extLst>
             <a:ext uri="{91240B29-F687-4f45-9708-019B960494DF}">
-              <a14:hiddenLine xmlns:a14="http://schemas.microsoft.com/office/drawing/2010/main" xmlns="" w="9525">
+              <a14:hiddenLine xmlns="" xmlns:a14="http://schemas.microsoft.com/office/drawing/2010/main" w="9525">
                 <a:solidFill>
                   <a:srgbClr val="000000"/>
                 </a:solidFill>
@@ -3415,7 +3420,7 @@
             <a:fld id="{02640F58-564D-2B4F-AE67-E407BA4FCF45}" type="datetimeFigureOut">
               <a:rPr lang="en-US" dirty="0"/>
               <a:pPr/>
-              <a:t>6/12/18</a:t>
+              <a:t>6/13/18</a:t>
             </a:fld>
             <a:endParaRPr lang="en-US" dirty="0"/>
           </a:p>
@@ -3566,7 +3571,7 @@
           <a:ln/>
           <a:extLst>
             <a:ext uri="{91240B29-F687-4f45-9708-019B960494DF}">
-              <a14:hiddenLine xmlns:a14="http://schemas.microsoft.com/office/drawing/2010/main" xmlns="" w="9525">
+              <a14:hiddenLine xmlns="" xmlns:a14="http://schemas.microsoft.com/office/drawing/2010/main" w="9525">
                 <a:solidFill>
                   <a:srgbClr val="000000"/>
                 </a:solidFill>
@@ -3633,7 +3638,7 @@
             <a:fld id="{F13A34C8-038E-2045-AF43-DF7DBB8E0E9E}" type="datetimeFigureOut">
               <a:rPr lang="en-US" dirty="0"/>
               <a:pPr/>
-              <a:t>6/12/18</a:t>
+              <a:t>6/13/18</a:t>
             </a:fld>
             <a:endParaRPr lang="en-US" dirty="0"/>
           </a:p>
@@ -3725,7 +3730,7 @@
             <a:fld id="{8818C68F-D26B-8F47-958C-23B49CF8A634}" type="datetimeFigureOut">
               <a:rPr lang="en-US" dirty="0"/>
               <a:pPr/>
-              <a:t>6/12/18</a:t>
+              <a:t>6/13/18</a:t>
             </a:fld>
             <a:endParaRPr lang="en-US" dirty="0"/>
           </a:p>
@@ -3989,7 +3994,7 @@
           <a:ln/>
           <a:extLst>
             <a:ext uri="{91240B29-F687-4f45-9708-019B960494DF}">
-              <a14:hiddenLine xmlns:a14="http://schemas.microsoft.com/office/drawing/2010/main" xmlns="" w="9525">
+              <a14:hiddenLine xmlns="" xmlns:a14="http://schemas.microsoft.com/office/drawing/2010/main" w="9525">
                 <a:solidFill>
                   <a:srgbClr val="000000"/>
                 </a:solidFill>
@@ -4170,7 +4175,7 @@
             <a:fld id="{D0DF5E60-9974-AC48-9591-99C2BB44B7CF}" type="datetimeFigureOut">
               <a:rPr lang="en-US" dirty="0"/>
               <a:pPr/>
-              <a:t>6/12/18</a:t>
+              <a:t>6/13/18</a:t>
             </a:fld>
             <a:endParaRPr lang="en-US" dirty="0"/>
           </a:p>
@@ -4485,7 +4490,7 @@
             <a:fld id="{18C79C5D-2A6F-F04D-97DA-BEF2467B64E4}" type="datetimeFigureOut">
               <a:rPr lang="en-US" dirty="0"/>
               <a:pPr/>
-              <a:t>6/12/18</a:t>
+              <a:t>6/13/18</a:t>
             </a:fld>
             <a:endParaRPr lang="en-US" dirty="0"/>
           </a:p>
@@ -4728,7 +4733,7 @@
             <a:fld id="{09B482E8-6E0E-1B4F-B1FD-C69DB9E858D9}" type="datetimeFigureOut">
               <a:rPr lang="en-US" dirty="0"/>
               <a:pPr/>
-              <a:t>6/12/18</a:t>
+              <a:t>6/13/18</a:t>
             </a:fld>
             <a:endParaRPr lang="en-US" dirty="0"/>
           </a:p>
@@ -5863,14 +5868,14 @@
             </a:br>
             <a:r>
               <a:rPr lang="de-DE" dirty="0"/>
-              <a:t>- X</a:t>
+              <a:t>- Höhenprofil</a:t>
             </a:r>
             <a:br>
               <a:rPr lang="de-DE" dirty="0"/>
             </a:br>
             <a:r>
               <a:rPr lang="de-DE" dirty="0"/>
-              <a:t>- Y</a:t>
+              <a:t>- Hash</a:t>
             </a:r>
           </a:p>
         </p:txBody>
@@ -6218,6 +6223,28 @@
           <a:bodyPr/>
           <a:lstStyle/>
           <a:p>
+            <a:endParaRPr lang="de-DE" dirty="0"/>
+          </a:p>
+          <a:p>
+            <a:r>
+              <a:rPr lang="de-DE" dirty="0"/>
+              <a:t>Gleichzeitiges Arbeiten an einem gemeinsamen </a:t>
+            </a:r>
+            <a:r>
+              <a:rPr lang="de-DE" dirty="0" err="1"/>
+              <a:t>Github</a:t>
+            </a:r>
+            <a:r>
+              <a:rPr lang="de-DE" dirty="0"/>
+              <a:t> </a:t>
+            </a:r>
+            <a:r>
+              <a:rPr lang="de-DE" dirty="0" err="1"/>
+              <a:t>Repo</a:t>
+            </a:r>
+            <a:endParaRPr lang="de-DE" dirty="0"/>
+          </a:p>
+          <a:p>
             <a:r>
               <a:rPr lang="de-DE" dirty="0"/>
               <a:t>Einbinden der Tracks ohne doppelte Daten</a:t>
@@ -6226,31 +6253,15 @@
           <a:p>
             <a:r>
               <a:rPr lang="de-DE" dirty="0"/>
-              <a:t>Gleichzeitiges Arbeiten an einem gemeinsamen </a:t>
-            </a:r>
-            <a:r>
-              <a:rPr lang="de-DE" dirty="0" err="1"/>
-              <a:t>Github</a:t>
-            </a:r>
-            <a:r>
-              <a:rPr lang="de-DE" dirty="0"/>
-              <a:t> </a:t>
-            </a:r>
-            <a:r>
-              <a:rPr lang="de-DE" dirty="0" err="1"/>
-              <a:t>Repo</a:t>
-            </a:r>
-            <a:endParaRPr lang="de-DE" dirty="0"/>
+              <a:t>Unbekannte Marker</a:t>
+            </a:r>
           </a:p>
           <a:p>
             <a:r>
               <a:rPr lang="de-DE" dirty="0" err="1"/>
               <a:t>Plugins</a:t>
             </a:r>
-            <a:r>
-              <a:rPr lang="de-DE" dirty="0"/>
-              <a:t>?</a:t>
-            </a:r>
+            <a:endParaRPr lang="de-DE" dirty="0"/>
           </a:p>
         </p:txBody>
       </p:sp>

</xml_diff>